<commit_message>
Update hydro color and updated/saved plots to output folder
</commit_message>
<xml_diff>
--- a/Project 1.pptx
+++ b/Project 1.pptx
@@ -210,7 +210,7 @@
           <a:p>
             <a:fld id="{A5C20BB3-3CCB-4FE5-991B-82F6BCB48AF3}" type="datetimeFigureOut">
               <a:rPr lang="en-US" smtClean="0"/>
-              <a:t>8/4/2019</a:t>
+              <a:t>8/5/2019</a:t>
             </a:fld>
             <a:endParaRPr lang="en-US"/>
           </a:p>
@@ -1446,7 +1446,19 @@
                 <a:ea typeface="+mn-ea"/>
                 <a:cs typeface="+mn-cs"/>
               </a:rPr>
-              <a:t>Discuss your findings. Did you find what you expected to find? If not, why not? What inferences or general conclusions can you draw from your analysis?</a:t>
+              <a:t>Discuss your findings. Did you find what you expected to find? If not, why not? What inferences or general conclusions can you draw from </a:t>
+            </a:r>
+            <a:r>
+              <a:rPr lang="en-US" sz="1200" b="0" i="0" kern="1200">
+                <a:solidFill>
+                  <a:schemeClr val="tx1"/>
+                </a:solidFill>
+                <a:effectLst/>
+                <a:latin typeface="+mn-lt"/>
+                <a:ea typeface="+mn-ea"/>
+                <a:cs typeface="+mn-cs"/>
+              </a:rPr>
+              <a:t>your analysis</a:t>
             </a:r>
             <a:br>
               <a:rPr lang="en-US" dirty="0"/>
@@ -1916,7 +1928,7 @@
           <a:p>
             <a:fld id="{1160EA64-D806-43AC-9DF2-F8C432F32B4C}" type="datetimeFigureOut">
               <a:rPr lang="en-US" dirty="0"/>
-              <a:t>8/4/2019</a:t>
+              <a:t>8/5/2019</a:t>
             </a:fld>
             <a:endParaRPr lang="en-US" dirty="0"/>
           </a:p>
@@ -2087,7 +2099,7 @@
           <a:p>
             <a:fld id="{E9F9C37B-1D36-470B-8223-D6C91242EC14}" type="datetimeFigureOut">
               <a:rPr lang="en-US" dirty="0"/>
-              <a:t>8/4/2019</a:t>
+              <a:t>8/5/2019</a:t>
             </a:fld>
             <a:endParaRPr lang="en-US" dirty="0"/>
           </a:p>
@@ -2267,7 +2279,7 @@
           <a:p>
             <a:fld id="{67C6F52A-A82B-47A2-A83A-8C4C91F2D59F}" type="datetimeFigureOut">
               <a:rPr lang="en-US" dirty="0"/>
-              <a:t>8/4/2019</a:t>
+              <a:t>8/5/2019</a:t>
             </a:fld>
             <a:endParaRPr lang="en-US" dirty="0"/>
           </a:p>
@@ -2437,7 +2449,7 @@
           <a:p>
             <a:fld id="{F070A7B3-6521-4DCA-87E5-044747A908C1}" type="datetimeFigureOut">
               <a:rPr lang="en-US" dirty="0"/>
-              <a:t>8/4/2019</a:t>
+              <a:t>8/5/2019</a:t>
             </a:fld>
             <a:endParaRPr lang="en-US" dirty="0"/>
           </a:p>
@@ -2706,7 +2718,7 @@
           <a:p>
             <a:fld id="{1160EA64-D806-43AC-9DF2-F8C432F32B4C}" type="datetimeFigureOut">
               <a:rPr lang="en-US" dirty="0"/>
-              <a:t>8/4/2019</a:t>
+              <a:t>8/5/2019</a:t>
             </a:fld>
             <a:endParaRPr lang="en-US" dirty="0"/>
           </a:p>
@@ -2939,7 +2951,7 @@
           <a:p>
             <a:fld id="{AB134690-1557-4C89-A502-4959FE7FAD70}" type="datetimeFigureOut">
               <a:rPr lang="en-US" dirty="0"/>
-              <a:t>8/4/2019</a:t>
+              <a:t>8/5/2019</a:t>
             </a:fld>
             <a:endParaRPr lang="en-US" dirty="0"/>
           </a:p>
@@ -3298,7 +3310,7 @@
           <a:p>
             <a:fld id="{4F7D4976-E339-4826-83B7-FBD03F55ECF8}" type="datetimeFigureOut">
               <a:rPr lang="en-US" dirty="0"/>
-              <a:t>8/4/2019</a:t>
+              <a:t>8/5/2019</a:t>
             </a:fld>
             <a:endParaRPr lang="en-US" dirty="0"/>
           </a:p>
@@ -3439,7 +3451,7 @@
           <a:p>
             <a:fld id="{E1037C31-9E7A-4F99-8774-A0E530DE1A42}" type="datetimeFigureOut">
               <a:rPr lang="en-US" dirty="0"/>
-              <a:t>8/4/2019</a:t>
+              <a:t>8/5/2019</a:t>
             </a:fld>
             <a:endParaRPr lang="en-US" dirty="0"/>
           </a:p>
@@ -3534,7 +3546,7 @@
           <a:p>
             <a:fld id="{C278504F-A551-4DE0-9316-4DCD1D8CC752}" type="datetimeFigureOut">
               <a:rPr lang="en-US" dirty="0"/>
-              <a:t>8/4/2019</a:t>
+              <a:t>8/5/2019</a:t>
             </a:fld>
             <a:endParaRPr lang="en-US" dirty="0"/>
           </a:p>
@@ -3891,7 +3903,7 @@
           <a:p>
             <a:fld id="{D1BE4249-C0D0-4B06-8692-E8BB871AF643}" type="datetimeFigureOut">
               <a:rPr lang="en-US" dirty="0"/>
-              <a:t>8/4/2019</a:t>
+              <a:t>8/5/2019</a:t>
             </a:fld>
             <a:endParaRPr lang="en-US" dirty="0"/>
           </a:p>
@@ -4248,7 +4260,7 @@
           <a:p>
             <a:fld id="{042B0DB6-F5C7-45FB-8CF3-31B45F9C2DAC}" type="datetimeFigureOut">
               <a:rPr lang="en-US" dirty="0"/>
-              <a:t>8/4/2019</a:t>
+              <a:t>8/5/2019</a:t>
             </a:fld>
             <a:endParaRPr lang="en-US" dirty="0"/>
           </a:p>
@@ -4490,7 +4502,7 @@
           <a:p>
             <a:fld id="{1160EA64-D806-43AC-9DF2-F8C432F32B4C}" type="datetimeFigureOut">
               <a:rPr lang="en-US" dirty="0"/>
-              <a:t>8/4/2019</a:t>
+              <a:t>8/5/2019</a:t>
             </a:fld>
             <a:endParaRPr lang="en-US" dirty="0"/>
           </a:p>
@@ -5560,10 +5572,10 @@
       </p:pic>
       <p:pic>
         <p:nvPicPr>
-          <p:cNvPr id="12" name="Picture 11">
+          <p:cNvPr id="4" name="Picture 3">
             <a:extLst>
               <a:ext uri="{FF2B5EF4-FFF2-40B4-BE49-F238E27FC236}">
-                <a16:creationId xmlns:a16="http://schemas.microsoft.com/office/drawing/2014/main" id="{4F164F6B-C5AC-44A1-BEC7-ECD24BD256EF}"/>
+                <a16:creationId xmlns:a16="http://schemas.microsoft.com/office/drawing/2014/main" id="{5C92F0EB-B928-4D5A-A474-ECFCDFC966CA}"/>
               </a:ext>
             </a:extLst>
           </p:cNvPr>
@@ -5580,8 +5592,38 @@
         </p:blipFill>
         <p:spPr>
           <a:xfrm>
-            <a:off x="4702014" y="1195875"/>
-            <a:ext cx="7382613" cy="3708634"/>
+            <a:off x="4853595" y="3245114"/>
+            <a:ext cx="7218662" cy="3522194"/>
+          </a:xfrm>
+          <a:prstGeom prst="rect">
+            <a:avLst/>
+          </a:prstGeom>
+        </p:spPr>
+      </p:pic>
+      <p:pic>
+        <p:nvPicPr>
+          <p:cNvPr id="5" name="Picture 4">
+            <a:extLst>
+              <a:ext uri="{FF2B5EF4-FFF2-40B4-BE49-F238E27FC236}">
+                <a16:creationId xmlns:a16="http://schemas.microsoft.com/office/drawing/2014/main" id="{B8186518-75F3-40F5-B996-3CBA6FC991DC}"/>
+              </a:ext>
+            </a:extLst>
+          </p:cNvPr>
+          <p:cNvPicPr>
+            <a:picLocks noChangeAspect="1"/>
+          </p:cNvPicPr>
+          <p:nvPr/>
+        </p:nvPicPr>
+        <p:blipFill>
+          <a:blip r:embed="rId6"/>
+          <a:stretch>
+            <a:fillRect/>
+          </a:stretch>
+        </p:blipFill>
+        <p:spPr>
+          <a:xfrm>
+            <a:off x="4853595" y="91862"/>
+            <a:ext cx="7218662" cy="3028474"/>
           </a:xfrm>
           <a:prstGeom prst="rect">
             <a:avLst/>
@@ -5882,41 +5924,6 @@
           </a:p>
         </p:txBody>
       </p:sp>
-      <p:sp>
-        <p:nvSpPr>
-          <p:cNvPr id="7" name="TextBox 6">
-            <a:extLst>
-              <a:ext uri="{FF2B5EF4-FFF2-40B4-BE49-F238E27FC236}">
-                <a16:creationId xmlns:a16="http://schemas.microsoft.com/office/drawing/2014/main" id="{FCD54170-41EA-41EA-AE21-D7E8EE48D15A}"/>
-              </a:ext>
-            </a:extLst>
-          </p:cNvPr>
-          <p:cNvSpPr txBox="1"/>
-          <p:nvPr/>
-        </p:nvSpPr>
-        <p:spPr>
-          <a:xfrm flipH="1">
-            <a:off x="6446519" y="2490952"/>
-            <a:ext cx="4165252" cy="369332"/>
-          </a:xfrm>
-          <a:prstGeom prst="rect">
-            <a:avLst/>
-          </a:prstGeom>
-          <a:noFill/>
-        </p:spPr>
-        <p:txBody>
-          <a:bodyPr wrap="square" rtlCol="0">
-            <a:spAutoFit/>
-          </a:bodyPr>
-          <a:lstStyle/>
-          <a:p>
-            <a:r>
-              <a:rPr lang="en-US" dirty="0"/>
-              <a:t>Add graph of HDI over time</a:t>
-            </a:r>
-          </a:p>
-        </p:txBody>
-      </p:sp>
       <p:pic>
         <p:nvPicPr>
           <p:cNvPr id="4098" name="Picture 2" descr="Image result for hDI images">
@@ -5960,6 +5967,36 @@
               </a14:hiddenFill>
             </a:ext>
           </a:extLst>
+        </p:spPr>
+      </p:pic>
+      <p:pic>
+        <p:nvPicPr>
+          <p:cNvPr id="4" name="Picture 3">
+            <a:extLst>
+              <a:ext uri="{FF2B5EF4-FFF2-40B4-BE49-F238E27FC236}">
+                <a16:creationId xmlns:a16="http://schemas.microsoft.com/office/drawing/2014/main" id="{26310073-FCD9-4147-9089-8771661E7646}"/>
+              </a:ext>
+            </a:extLst>
+          </p:cNvPr>
+          <p:cNvPicPr>
+            <a:picLocks noChangeAspect="1"/>
+          </p:cNvPicPr>
+          <p:nvPr/>
+        </p:nvPicPr>
+        <p:blipFill>
+          <a:blip r:embed="rId4"/>
+          <a:stretch>
+            <a:fillRect/>
+          </a:stretch>
+        </p:blipFill>
+        <p:spPr>
+          <a:xfrm>
+            <a:off x="5299180" y="1215957"/>
+            <a:ext cx="6247659" cy="4401232"/>
+          </a:xfrm>
+          <a:prstGeom prst="rect">
+            <a:avLst/>
+          </a:prstGeom>
         </p:spPr>
       </p:pic>
     </p:spTree>
@@ -6189,8 +6226,8 @@
         </p:nvSpPr>
         <p:spPr>
           <a:xfrm>
-            <a:off x="643467" y="2486352"/>
-            <a:ext cx="3363974" cy="3589406"/>
+            <a:off x="313267" y="2354744"/>
+            <a:ext cx="3987800" cy="3589406"/>
           </a:xfrm>
         </p:spPr>
         <p:txBody>
@@ -6208,7 +6245,7 @@
                   <a:schemeClr val="bg1"/>
                 </a:solidFill>
               </a:rPr>
-              <a:t>Total amount of energy consumed by “green” sources</a:t>
+              <a:t>Green Sources = Hydro &amp; Renewables (Solar,  Wind, Biomass, Geothermal)</a:t>
             </a:r>
           </a:p>
           <a:p>
@@ -6221,6 +6258,19 @@
                   <a:schemeClr val="bg1"/>
                 </a:solidFill>
               </a:rPr>
+              <a:t>Non-Green = Oil, Natural Gas, &amp; Coal</a:t>
+            </a:r>
+          </a:p>
+          <a:p>
+            <a:pPr marL="0" indent="0" algn="ctr">
+              <a:buNone/>
+            </a:pPr>
+            <a:r>
+              <a:rPr lang="en-US" dirty="0">
+                <a:solidFill>
+                  <a:schemeClr val="bg1"/>
+                </a:solidFill>
+              </a:rPr>
               <a:t>Source:</a:t>
             </a:r>
             <a:br>
@@ -6241,57 +6291,42 @@
           </a:p>
         </p:txBody>
       </p:sp>
-      <p:pic>
-        <p:nvPicPr>
-          <p:cNvPr id="8" name="Picture 4" descr="Image result for population images">
-            <a:extLst>
-              <a:ext uri="{FF2B5EF4-FFF2-40B4-BE49-F238E27FC236}">
-                <a16:creationId xmlns:a16="http://schemas.microsoft.com/office/drawing/2014/main" id="{BE3318A3-E693-456A-9442-B0272A0DE7C1}"/>
-              </a:ext>
-            </a:extLst>
-          </p:cNvPr>
-          <p:cNvPicPr>
-            <a:picLocks noChangeAspect="1" noChangeArrowheads="1"/>
-          </p:cNvPicPr>
-          <p:nvPr/>
-        </p:nvPicPr>
-        <p:blipFill rotWithShape="1">
-          <a:blip r:embed="rId3">
-            <a:extLst>
-              <a:ext uri="{28A0092B-C50C-407E-A947-70E740481C1C}">
-                <a14:useLocalDpi xmlns:a14="http://schemas.microsoft.com/office/drawing/2010/main" val="0"/>
-              </a:ext>
-            </a:extLst>
-          </a:blip>
-          <a:srcRect t="-846" b="9654"/>
-          <a:stretch/>
-        </p:blipFill>
-        <p:spPr bwMode="auto">
-          <a:xfrm>
-            <a:off x="269894" y="4371648"/>
-            <a:ext cx="4111120" cy="2345420"/>
-          </a:xfrm>
-          <a:prstGeom prst="rect">
-            <a:avLst/>
-          </a:prstGeom>
-          <a:noFill/>
-          <a:extLst>
-            <a:ext uri="{909E8E84-426E-40DD-AFC4-6F175D3DCCD1}">
-              <a14:hiddenFill xmlns:a14="http://schemas.microsoft.com/office/drawing/2010/main">
-                <a:solidFill>
-                  <a:srgbClr val="FFFFFF"/>
-                </a:solidFill>
-              </a14:hiddenFill>
-            </a:ext>
-          </a:extLst>
-        </p:spPr>
-      </p:pic>
       <p:pic>
         <p:nvPicPr>
           <p:cNvPr id="6" name="Picture 5">
             <a:extLst>
               <a:ext uri="{FF2B5EF4-FFF2-40B4-BE49-F238E27FC236}">
                 <a16:creationId xmlns:a16="http://schemas.microsoft.com/office/drawing/2014/main" id="{1B3FA093-37D8-4C23-9C70-60766F46C408}"/>
+              </a:ext>
+            </a:extLst>
+          </p:cNvPr>
+          <p:cNvPicPr>
+            <a:picLocks noChangeAspect="1"/>
+          </p:cNvPicPr>
+          <p:nvPr/>
+        </p:nvPicPr>
+        <p:blipFill>
+          <a:blip r:embed="rId3"/>
+          <a:stretch>
+            <a:fillRect/>
+          </a:stretch>
+        </p:blipFill>
+        <p:spPr>
+          <a:xfrm>
+            <a:off x="5297763" y="147624"/>
+            <a:ext cx="6149600" cy="3239812"/>
+          </a:xfrm>
+          <a:prstGeom prst="rect">
+            <a:avLst/>
+          </a:prstGeom>
+        </p:spPr>
+      </p:pic>
+      <p:pic>
+        <p:nvPicPr>
+          <p:cNvPr id="10" name="Picture 9">
+            <a:extLst>
+              <a:ext uri="{FF2B5EF4-FFF2-40B4-BE49-F238E27FC236}">
+                <a16:creationId xmlns:a16="http://schemas.microsoft.com/office/drawing/2014/main" id="{48E9EB68-C630-427C-BE78-F0B9996CD75A}"/>
               </a:ext>
             </a:extLst>
           </p:cNvPr>
@@ -6308,8 +6343,8 @@
         </p:blipFill>
         <p:spPr>
           <a:xfrm>
-            <a:off x="5297763" y="189188"/>
-            <a:ext cx="6149600" cy="3239812"/>
+            <a:off x="6961781" y="387775"/>
+            <a:ext cx="3227691" cy="1866472"/>
           </a:xfrm>
           <a:prstGeom prst="rect">
             <a:avLst/>
@@ -6318,10 +6353,199 @@
       </p:pic>
       <p:pic>
         <p:nvPicPr>
-          <p:cNvPr id="10" name="Picture 9">
+          <p:cNvPr id="9" name="Picture 8">
             <a:extLst>
               <a:ext uri="{FF2B5EF4-FFF2-40B4-BE49-F238E27FC236}">
-                <a16:creationId xmlns:a16="http://schemas.microsoft.com/office/drawing/2014/main" id="{48E9EB68-C630-427C-BE78-F0B9996CD75A}"/>
+                <a16:creationId xmlns:a16="http://schemas.microsoft.com/office/drawing/2014/main" id="{03AA7482-6741-4BF9-8331-44A9699C5D50}"/>
+              </a:ext>
+            </a:extLst>
+          </p:cNvPr>
+          <p:cNvPicPr>
+            <a:picLocks noChangeAspect="1"/>
+          </p:cNvPicPr>
+          <p:nvPr/>
+        </p:nvPicPr>
+        <p:blipFill rotWithShape="1">
+          <a:blip r:embed="rId3"/>
+          <a:srcRect l="44646" t="6951" r="37386" b="68460"/>
+          <a:stretch/>
+        </p:blipFill>
+        <p:spPr>
+          <a:xfrm>
+            <a:off x="5902035" y="387775"/>
+            <a:ext cx="1104900" cy="796637"/>
+          </a:xfrm>
+          <a:prstGeom prst="rect">
+            <a:avLst/>
+          </a:prstGeom>
+        </p:spPr>
+      </p:pic>
+      <p:pic>
+        <p:nvPicPr>
+          <p:cNvPr id="15" name="Picture 2" descr="https://www.challenge.ma/wp-content/uploads/2017/03/Noor-2.jpg">
+            <a:extLst>
+              <a:ext uri="{FF2B5EF4-FFF2-40B4-BE49-F238E27FC236}">
+                <a16:creationId xmlns:a16="http://schemas.microsoft.com/office/drawing/2014/main" id="{7299DBBF-3C96-45AC-AADE-944B7D9CB52F}"/>
+              </a:ext>
+            </a:extLst>
+          </p:cNvPr>
+          <p:cNvPicPr>
+            <a:picLocks noChangeAspect="1" noChangeArrowheads="1"/>
+          </p:cNvPicPr>
+          <p:nvPr/>
+        </p:nvPicPr>
+        <p:blipFill rotWithShape="1">
+          <a:blip r:embed="rId5">
+            <a:extLst>
+              <a:ext uri="{28A0092B-C50C-407E-A947-70E740481C1C}">
+                <a14:useLocalDpi xmlns:a14="http://schemas.microsoft.com/office/drawing/2010/main" val="0"/>
+              </a:ext>
+            </a:extLst>
+          </a:blip>
+          <a:srcRect r="24941"/>
+          <a:stretch/>
+        </p:blipFill>
+        <p:spPr bwMode="auto">
+          <a:xfrm>
+            <a:off x="76566" y="5426137"/>
+            <a:ext cx="1383928" cy="1143000"/>
+          </a:xfrm>
+          <a:prstGeom prst="rect">
+            <a:avLst/>
+          </a:prstGeom>
+          <a:noFill/>
+          <a:extLst>
+            <a:ext uri="{909E8E84-426E-40DD-AFC4-6F175D3DCCD1}">
+              <a14:hiddenFill xmlns:a14="http://schemas.microsoft.com/office/drawing/2010/main">
+                <a:solidFill>
+                  <a:srgbClr val="FFFFFF"/>
+                </a:solidFill>
+              </a14:hiddenFill>
+            </a:ext>
+          </a:extLst>
+        </p:spPr>
+      </p:pic>
+      <p:pic>
+        <p:nvPicPr>
+          <p:cNvPr id="21" name="Picture 20">
+            <a:extLst>
+              <a:ext uri="{FF2B5EF4-FFF2-40B4-BE49-F238E27FC236}">
+                <a16:creationId xmlns:a16="http://schemas.microsoft.com/office/drawing/2014/main" id="{9A766A6C-F76E-4F7E-B024-488F5A18932E}"/>
+              </a:ext>
+            </a:extLst>
+          </p:cNvPr>
+          <p:cNvPicPr>
+            <a:picLocks noChangeAspect="1"/>
+          </p:cNvPicPr>
+          <p:nvPr/>
+        </p:nvPicPr>
+        <p:blipFill rotWithShape="1">
+          <a:blip r:embed="rId6">
+            <a:extLst>
+              <a:ext uri="{837473B0-CC2E-450A-ABE3-18F120FF3D39}">
+                <a1611:picAttrSrcUrl xmlns:a1611="http://schemas.microsoft.com/office/drawing/2016/11/main" r:id="rId7"/>
+              </a:ext>
+            </a:extLst>
+          </a:blip>
+          <a:srcRect l="25437" t="20968" r="14856"/>
+          <a:stretch/>
+        </p:blipFill>
+        <p:spPr>
+          <a:xfrm>
+            <a:off x="76568" y="4149447"/>
+            <a:ext cx="1383930" cy="1143000"/>
+          </a:xfrm>
+          <a:prstGeom prst="rect">
+            <a:avLst/>
+          </a:prstGeom>
+        </p:spPr>
+      </p:pic>
+      <p:pic>
+        <p:nvPicPr>
+          <p:cNvPr id="16" name="Picture 2" descr="Image result for power plant image">
+            <a:extLst>
+              <a:ext uri="{FF2B5EF4-FFF2-40B4-BE49-F238E27FC236}">
+                <a16:creationId xmlns:a16="http://schemas.microsoft.com/office/drawing/2014/main" id="{04FE6B50-E0BD-4874-A74F-7140A43F5D2F}"/>
+              </a:ext>
+            </a:extLst>
+          </p:cNvPr>
+          <p:cNvPicPr>
+            <a:picLocks noChangeAspect="1" noChangeArrowheads="1"/>
+          </p:cNvPicPr>
+          <p:nvPr/>
+        </p:nvPicPr>
+        <p:blipFill rotWithShape="1">
+          <a:blip r:embed="rId8">
+            <a:extLst>
+              <a:ext uri="{28A0092B-C50C-407E-A947-70E740481C1C}">
+                <a14:useLocalDpi xmlns:a14="http://schemas.microsoft.com/office/drawing/2010/main" val="0"/>
+              </a:ext>
+            </a:extLst>
+          </a:blip>
+          <a:srcRect l="15788"/>
+          <a:stretch/>
+        </p:blipFill>
+        <p:spPr bwMode="auto">
+          <a:xfrm>
+            <a:off x="1606214" y="5426137"/>
+            <a:ext cx="1383928" cy="1143000"/>
+          </a:xfrm>
+          <a:prstGeom prst="rect">
+            <a:avLst/>
+          </a:prstGeom>
+          <a:noFill/>
+          <a:extLst>
+            <a:ext uri="{909E8E84-426E-40DD-AFC4-6F175D3DCCD1}">
+              <a14:hiddenFill xmlns:a14="http://schemas.microsoft.com/office/drawing/2010/main">
+                <a:solidFill>
+                  <a:srgbClr val="FFFFFF"/>
+                </a:solidFill>
+              </a14:hiddenFill>
+            </a:ext>
+          </a:extLst>
+        </p:spPr>
+      </p:pic>
+      <p:pic>
+        <p:nvPicPr>
+          <p:cNvPr id="18" name="Picture 17">
+            <a:extLst>
+              <a:ext uri="{FF2B5EF4-FFF2-40B4-BE49-F238E27FC236}">
+                <a16:creationId xmlns:a16="http://schemas.microsoft.com/office/drawing/2014/main" id="{629B0AEE-CC48-4046-AACC-C5799BED4BBA}"/>
+              </a:ext>
+            </a:extLst>
+          </p:cNvPr>
+          <p:cNvPicPr>
+            <a:picLocks noChangeAspect="1"/>
+          </p:cNvPicPr>
+          <p:nvPr/>
+        </p:nvPicPr>
+        <p:blipFill rotWithShape="1">
+          <a:blip r:embed="rId9">
+            <a:extLst>
+              <a:ext uri="{837473B0-CC2E-450A-ABE3-18F120FF3D39}">
+                <a1611:picAttrSrcUrl xmlns:a1611="http://schemas.microsoft.com/office/drawing/2016/11/main" r:id="rId10"/>
+              </a:ext>
+            </a:extLst>
+          </a:blip>
+          <a:srcRect r="10099"/>
+          <a:stretch/>
+        </p:blipFill>
+        <p:spPr>
+          <a:xfrm>
+            <a:off x="1602154" y="4149447"/>
+            <a:ext cx="1394079" cy="1143000"/>
+          </a:xfrm>
+          <a:prstGeom prst="rect">
+            <a:avLst/>
+          </a:prstGeom>
+        </p:spPr>
+      </p:pic>
+      <p:pic>
+        <p:nvPicPr>
+          <p:cNvPr id="24" name="Picture 23">
+            <a:extLst>
+              <a:ext uri="{FF2B5EF4-FFF2-40B4-BE49-F238E27FC236}">
+                <a16:creationId xmlns:a16="http://schemas.microsoft.com/office/drawing/2014/main" id="{8658E818-B918-47D7-AFAA-80A9CFA78509}"/>
               </a:ext>
             </a:extLst>
           </p:cNvPr>
@@ -6331,15 +6555,87 @@
           <p:nvPr/>
         </p:nvPicPr>
         <p:blipFill>
-          <a:blip r:embed="rId5"/>
+          <a:blip r:embed="rId11">
+            <a:extLst>
+              <a:ext uri="{837473B0-CC2E-450A-ABE3-18F120FF3D39}">
+                <a1611:picAttrSrcUrl xmlns:a1611="http://schemas.microsoft.com/office/drawing/2016/11/main" r:id="rId12"/>
+              </a:ext>
+            </a:extLst>
+          </a:blip>
           <a:stretch>
             <a:fillRect/>
           </a:stretch>
         </p:blipFill>
         <p:spPr>
           <a:xfrm>
-            <a:off x="5742292" y="3568307"/>
-            <a:ext cx="5361708" cy="3100506"/>
+            <a:off x="3093041" y="4149447"/>
+            <a:ext cx="1428750" cy="1143000"/>
+          </a:xfrm>
+          <a:prstGeom prst="rect">
+            <a:avLst/>
+          </a:prstGeom>
+        </p:spPr>
+      </p:pic>
+      <p:pic>
+        <p:nvPicPr>
+          <p:cNvPr id="27" name="Picture 26">
+            <a:extLst>
+              <a:ext uri="{FF2B5EF4-FFF2-40B4-BE49-F238E27FC236}">
+                <a16:creationId xmlns:a16="http://schemas.microsoft.com/office/drawing/2014/main" id="{B7C748F6-AB5E-4E51-A5BB-877405A493AC}"/>
+              </a:ext>
+            </a:extLst>
+          </p:cNvPr>
+          <p:cNvPicPr>
+            <a:picLocks noChangeAspect="1"/>
+          </p:cNvPicPr>
+          <p:nvPr/>
+        </p:nvPicPr>
+        <p:blipFill>
+          <a:blip r:embed="rId13">
+            <a:extLst>
+              <a:ext uri="{837473B0-CC2E-450A-ABE3-18F120FF3D39}">
+                <a1611:picAttrSrcUrl xmlns:a1611="http://schemas.microsoft.com/office/drawing/2016/11/main" r:id="rId14"/>
+              </a:ext>
+            </a:extLst>
+          </a:blip>
+          <a:stretch>
+            <a:fillRect/>
+          </a:stretch>
+        </p:blipFill>
+        <p:spPr>
+          <a:xfrm>
+            <a:off x="3093041" y="5426137"/>
+            <a:ext cx="1428750" cy="1143000"/>
+          </a:xfrm>
+          <a:prstGeom prst="rect">
+            <a:avLst/>
+          </a:prstGeom>
+        </p:spPr>
+      </p:pic>
+      <p:pic>
+        <p:nvPicPr>
+          <p:cNvPr id="4" name="Picture 3">
+            <a:extLst>
+              <a:ext uri="{FF2B5EF4-FFF2-40B4-BE49-F238E27FC236}">
+                <a16:creationId xmlns:a16="http://schemas.microsoft.com/office/drawing/2014/main" id="{7E88186A-F3AE-4DC1-9377-A138EB1AAE37}"/>
+              </a:ext>
+            </a:extLst>
+          </p:cNvPr>
+          <p:cNvPicPr>
+            <a:picLocks noChangeAspect="1"/>
+          </p:cNvPicPr>
+          <p:nvPr/>
+        </p:nvPicPr>
+        <p:blipFill>
+          <a:blip r:embed="rId15"/>
+          <a:stretch>
+            <a:fillRect/>
+          </a:stretch>
+        </p:blipFill>
+        <p:spPr>
+          <a:xfrm>
+            <a:off x="6452753" y="3505978"/>
+            <a:ext cx="4208320" cy="3210730"/>
           </a:xfrm>
           <a:prstGeom prst="rect">
             <a:avLst/>
@@ -7542,7 +7838,7 @@
                   <a:srgbClr val="404040"/>
                 </a:solidFill>
               </a:rPr>
-              <a:t>energy increases with prosperity</a:t>
+              <a:t>energy increases with its prosperity</a:t>
             </a:r>
           </a:p>
           <a:p>
@@ -8142,8 +8438,8 @@
         </p:nvSpPr>
         <p:spPr>
           <a:xfrm>
-            <a:off x="1481959" y="1874569"/>
-            <a:ext cx="9175531" cy="2879256"/>
+            <a:off x="1970842" y="1874569"/>
+            <a:ext cx="8220723" cy="2879256"/>
           </a:xfrm>
         </p:spPr>
         <p:txBody>
@@ -8152,28 +8448,82 @@
           </a:bodyPr>
           <a:lstStyle/>
           <a:p>
+            <a:pPr marL="0" indent="0" algn="ctr">
+              <a:buNone/>
+            </a:pPr>
             <a:r>
               <a:rPr lang="en-US" sz="2400" dirty="0">
                 <a:solidFill>
                   <a:srgbClr val="404040"/>
                 </a:solidFill>
               </a:rPr>
-              <a:t>Capacity increases with population and HDI in most cases</a:t>
-            </a:r>
-          </a:p>
-          <a:p>
+              <a:t>A country’s energy consumption and use of “green” </a:t>
+            </a:r>
+          </a:p>
+          <a:p>
+            <a:pPr marL="0" indent="0" algn="ctr">
+              <a:buNone/>
+            </a:pPr>
             <a:r>
               <a:rPr lang="en-US" sz="2400" dirty="0">
                 <a:solidFill>
                   <a:srgbClr val="404040"/>
                 </a:solidFill>
               </a:rPr>
-              <a:t>Capacity is dependent on other variables (politics, war, etc.)</a:t>
-            </a:r>
-          </a:p>
-          <a:p>
+              <a:t>energy </a:t>
+            </a:r>
+            <a:r>
+              <a:rPr lang="en-US" sz="2400" u="sng" dirty="0">
+                <a:solidFill>
+                  <a:srgbClr val="404040"/>
+                </a:solidFill>
+              </a:rPr>
+              <a:t>does not</a:t>
+            </a:r>
             <a:r>
               <a:rPr lang="en-US" sz="2400" dirty="0">
+                <a:solidFill>
+                  <a:srgbClr val="404040"/>
+                </a:solidFill>
+              </a:rPr>
+              <a:t> always increase with its prosperity</a:t>
+            </a:r>
+            <a:br>
+              <a:rPr lang="en-US" sz="2400" dirty="0">
+                <a:solidFill>
+                  <a:srgbClr val="404040"/>
+                </a:solidFill>
+              </a:rPr>
+            </a:br>
+            <a:endParaRPr lang="en-US" sz="2400" dirty="0">
+              <a:solidFill>
+                <a:srgbClr val="404040"/>
+              </a:solidFill>
+            </a:endParaRPr>
+          </a:p>
+          <a:p>
+            <a:r>
+              <a:rPr lang="en-US" sz="2000" dirty="0">
+                <a:solidFill>
+                  <a:srgbClr val="404040"/>
+                </a:solidFill>
+              </a:rPr>
+              <a:t>Capacity increases with population and prosperity in most cases</a:t>
+            </a:r>
+          </a:p>
+          <a:p>
+            <a:r>
+              <a:rPr lang="en-US" sz="2000" dirty="0">
+                <a:solidFill>
+                  <a:srgbClr val="404040"/>
+                </a:solidFill>
+              </a:rPr>
+              <a:t>Consumption is dependent on other variables (politics, war, etc.)</a:t>
+            </a:r>
+          </a:p>
+          <a:p>
+            <a:r>
+              <a:rPr lang="en-US" sz="2000" dirty="0">
                 <a:solidFill>
                   <a:srgbClr val="404040"/>
                 </a:solidFill>
@@ -8183,14 +8533,14 @@
           </a:p>
           <a:p>
             <a:r>
-              <a:rPr lang="en-US" sz="2400" dirty="0">
+              <a:rPr lang="en-US" sz="2000" dirty="0">
                 <a:solidFill>
                   <a:srgbClr val="404040"/>
                 </a:solidFill>
               </a:rPr>
               <a:t>Consumption from “green” fuel sources is not related to prosperity</a:t>
             </a:r>
-            <a:endParaRPr sz="2400" dirty="0">
+            <a:endParaRPr sz="2000" dirty="0">
               <a:solidFill>
                 <a:srgbClr val="404040"/>
               </a:solidFill>

</xml_diff>